<commit_message>
drafted responsive design pptx
</commit_message>
<xml_diff>
--- a/streaks design.pptx
+++ b/streaks design.pptx
@@ -107,6 +107,14 @@
       </a:defRPr>
     </a:lvl9pPr>
   </p:defaultTextStyle>
+  <p:extLst>
+    <p:ext uri="{EFAFB233-063F-42B5-8137-9DF3F51BA10A}">
+      <p15:sldGuideLst xmlns:p15="http://schemas.microsoft.com/office/powerpoint/2012/main"/>
+    </p:ext>
+    <p:ext uri="{2D200454-40CA-4A62-9FC3-DE9A4176ACB9}">
+      <p15:notesGuideLst xmlns:p15="http://schemas.microsoft.com/office/powerpoint/2012/main"/>
+    </p:ext>
+  </p:extLst>
 </p:presentation>
 </file>
 
@@ -1321,7 +1329,7 @@
           <a:p>
             <a:fld id="{86F5A906-BA5C-4372-A781-B335AC90F8E5}" type="datetimeFigureOut">
               <a:rPr lang="en-US" smtClean="0"/>
-              <a:t>8/20/2021</a:t>
+              <a:t>8/21/2021</a:t>
             </a:fld>
             <a:endParaRPr lang="en-US"/>
           </a:p>
@@ -1706,8 +1714,8 @@
         </p:nvSpPr>
         <p:spPr>
           <a:xfrm>
-            <a:off x="1234440" y="4489454"/>
-            <a:ext cx="13990320" cy="9550400"/>
+            <a:off x="1234440" y="4489453"/>
+            <a:ext cx="13990320" cy="9550401"/>
           </a:xfrm>
         </p:spPr>
         <p:txBody>
@@ -1738,8 +1746,8 @@
         </p:nvSpPr>
         <p:spPr>
           <a:xfrm>
-            <a:off x="2057400" y="14408154"/>
-            <a:ext cx="12344400" cy="6623048"/>
+            <a:off x="2057403" y="14408154"/>
+            <a:ext cx="12344401" cy="6623048"/>
           </a:xfrm>
         </p:spPr>
         <p:txBody>
@@ -1749,35 +1757,35 @@
               <a:buNone/>
               <a:defRPr sz="4320"/>
             </a:lvl1pPr>
-            <a:lvl2pPr marL="822858" indent="0" algn="ctr">
+            <a:lvl2pPr marL="822792" indent="0" algn="ctr">
               <a:buNone/>
               <a:defRPr sz="3600"/>
             </a:lvl2pPr>
-            <a:lvl3pPr marL="1645714" indent="0" algn="ctr">
+            <a:lvl3pPr marL="1645583" indent="0" algn="ctr">
               <a:buNone/>
               <a:defRPr sz="3240"/>
             </a:lvl3pPr>
-            <a:lvl4pPr marL="2468572" indent="0" algn="ctr">
+            <a:lvl4pPr marL="2468375" indent="0" algn="ctr">
               <a:buNone/>
               <a:defRPr sz="2880"/>
             </a:lvl4pPr>
-            <a:lvl5pPr marL="3291429" indent="0" algn="ctr">
+            <a:lvl5pPr marL="3291165" indent="0" algn="ctr">
               <a:buNone/>
               <a:defRPr sz="2880"/>
             </a:lvl5pPr>
-            <a:lvl6pPr marL="4114286" indent="0" algn="ctr">
+            <a:lvl6pPr marL="4113957" indent="0" algn="ctr">
               <a:buNone/>
               <a:defRPr sz="2880"/>
             </a:lvl6pPr>
-            <a:lvl7pPr marL="4937144" indent="0" algn="ctr">
+            <a:lvl7pPr marL="4936749" indent="0" algn="ctr">
               <a:buNone/>
               <a:defRPr sz="2880"/>
             </a:lvl7pPr>
-            <a:lvl8pPr marL="5760002" indent="0" algn="ctr">
+            <a:lvl8pPr marL="5759541" indent="0" algn="ctr">
               <a:buNone/>
               <a:defRPr sz="2880"/>
             </a:lvl8pPr>
-            <a:lvl9pPr marL="6582859" indent="0" algn="ctr">
+            <a:lvl9pPr marL="6582332" indent="0" algn="ctr">
               <a:buNone/>
               <a:defRPr sz="2880"/>
             </a:lvl9pPr>
@@ -1808,7 +1816,7 @@
           <a:p>
             <a:fld id="{20292C77-41DF-4B3F-8776-3D22A814E10A}" type="datetimeFigureOut">
               <a:rPr lang="en-US" smtClean="0"/>
-              <a:t>8/20/2021</a:t>
+              <a:t>8/21/2021</a:t>
             </a:fld>
             <a:endParaRPr lang="en-US"/>
           </a:p>
@@ -1978,7 +1986,7 @@
           <a:p>
             <a:fld id="{20292C77-41DF-4B3F-8776-3D22A814E10A}" type="datetimeFigureOut">
               <a:rPr lang="en-US" smtClean="0"/>
-              <a:t>8/20/2021</a:t>
+              <a:t>8/21/2021</a:t>
             </a:fld>
             <a:endParaRPr lang="en-US"/>
           </a:p>
@@ -2068,8 +2076,8 @@
         </p:nvSpPr>
         <p:spPr>
           <a:xfrm>
-            <a:off x="11778620" y="1460501"/>
-            <a:ext cx="3549015" cy="23247353"/>
+            <a:off x="11778621" y="1460503"/>
+            <a:ext cx="3549016" cy="23247353"/>
           </a:xfrm>
         </p:spPr>
         <p:txBody>
@@ -2096,7 +2104,7 @@
         </p:nvSpPr>
         <p:spPr>
           <a:xfrm>
-            <a:off x="1131575" y="1460501"/>
+            <a:off x="1131578" y="1460503"/>
             <a:ext cx="10441305" cy="23247353"/>
           </a:xfrm>
         </p:spPr>
@@ -2158,7 +2166,7 @@
           <a:p>
             <a:fld id="{20292C77-41DF-4B3F-8776-3D22A814E10A}" type="datetimeFigureOut">
               <a:rPr lang="en-US" smtClean="0"/>
-              <a:t>8/20/2021</a:t>
+              <a:t>8/21/2021</a:t>
             </a:fld>
             <a:endParaRPr lang="en-US"/>
           </a:p>
@@ -2328,7 +2336,7 @@
           <a:p>
             <a:fld id="{20292C77-41DF-4B3F-8776-3D22A814E10A}" type="datetimeFigureOut">
               <a:rPr lang="en-US" smtClean="0"/>
-              <a:t>8/20/2021</a:t>
+              <a:t>8/21/2021</a:t>
             </a:fld>
             <a:endParaRPr lang="en-US"/>
           </a:p>
@@ -2418,7 +2426,7 @@
         </p:nvSpPr>
         <p:spPr>
           <a:xfrm>
-            <a:off x="1122998" y="6838959"/>
+            <a:off x="1122999" y="6838960"/>
             <a:ext cx="14196060" cy="11410948"/>
           </a:xfrm>
         </p:spPr>
@@ -2450,8 +2458,8 @@
         </p:nvSpPr>
         <p:spPr>
           <a:xfrm>
-            <a:off x="1122998" y="18357858"/>
-            <a:ext cx="14196060" cy="6000748"/>
+            <a:off x="1122999" y="18357861"/>
+            <a:ext cx="14196060" cy="6000747"/>
           </a:xfrm>
         </p:spPr>
         <p:txBody>
@@ -2465,7 +2473,7 @@
                 </a:solidFill>
               </a:defRPr>
             </a:lvl1pPr>
-            <a:lvl2pPr marL="822858" indent="0">
+            <a:lvl2pPr marL="822792" indent="0">
               <a:buNone/>
               <a:defRPr sz="3600">
                 <a:solidFill>
@@ -2475,7 +2483,7 @@
                 </a:solidFill>
               </a:defRPr>
             </a:lvl2pPr>
-            <a:lvl3pPr marL="1645714" indent="0">
+            <a:lvl3pPr marL="1645583" indent="0">
               <a:buNone/>
               <a:defRPr sz="3240">
                 <a:solidFill>
@@ -2485,7 +2493,7 @@
                 </a:solidFill>
               </a:defRPr>
             </a:lvl3pPr>
-            <a:lvl4pPr marL="2468572" indent="0">
+            <a:lvl4pPr marL="2468375" indent="0">
               <a:buNone/>
               <a:defRPr sz="2880">
                 <a:solidFill>
@@ -2495,7 +2503,7 @@
                 </a:solidFill>
               </a:defRPr>
             </a:lvl4pPr>
-            <a:lvl5pPr marL="3291429" indent="0">
+            <a:lvl5pPr marL="3291165" indent="0">
               <a:buNone/>
               <a:defRPr sz="2880">
                 <a:solidFill>
@@ -2505,7 +2513,7 @@
                 </a:solidFill>
               </a:defRPr>
             </a:lvl5pPr>
-            <a:lvl6pPr marL="4114286" indent="0">
+            <a:lvl6pPr marL="4113957" indent="0">
               <a:buNone/>
               <a:defRPr sz="2880">
                 <a:solidFill>
@@ -2515,7 +2523,7 @@
                 </a:solidFill>
               </a:defRPr>
             </a:lvl6pPr>
-            <a:lvl7pPr marL="4937144" indent="0">
+            <a:lvl7pPr marL="4936749" indent="0">
               <a:buNone/>
               <a:defRPr sz="2880">
                 <a:solidFill>
@@ -2525,7 +2533,7 @@
                 </a:solidFill>
               </a:defRPr>
             </a:lvl7pPr>
-            <a:lvl8pPr marL="5760002" indent="0">
+            <a:lvl8pPr marL="5759541" indent="0">
               <a:buNone/>
               <a:defRPr sz="2880">
                 <a:solidFill>
@@ -2535,7 +2543,7 @@
                 </a:solidFill>
               </a:defRPr>
             </a:lvl8pPr>
-            <a:lvl9pPr marL="6582859" indent="0">
+            <a:lvl9pPr marL="6582332" indent="0">
               <a:buNone/>
               <a:defRPr sz="2880">
                 <a:solidFill>
@@ -2572,7 +2580,7 @@
           <a:p>
             <a:fld id="{20292C77-41DF-4B3F-8776-3D22A814E10A}" type="datetimeFigureOut">
               <a:rPr lang="en-US" smtClean="0"/>
-              <a:t>8/20/2021</a:t>
+              <a:t>8/21/2021</a:t>
             </a:fld>
             <a:endParaRPr lang="en-US"/>
           </a:p>
@@ -2685,7 +2693,7 @@
         </p:nvSpPr>
         <p:spPr>
           <a:xfrm>
-            <a:off x="1131570" y="7302502"/>
+            <a:off x="1131573" y="7302502"/>
             <a:ext cx="6995160" cy="17405352"/>
           </a:xfrm>
         </p:spPr>
@@ -2742,7 +2750,7 @@
         </p:nvSpPr>
         <p:spPr>
           <a:xfrm>
-            <a:off x="8332470" y="7302502"/>
+            <a:off x="8332472" y="7302502"/>
             <a:ext cx="6995160" cy="17405352"/>
           </a:xfrm>
         </p:spPr>
@@ -2804,7 +2812,7 @@
           <a:p>
             <a:fld id="{20292C77-41DF-4B3F-8776-3D22A814E10A}" type="datetimeFigureOut">
               <a:rPr lang="en-US" smtClean="0"/>
-              <a:t>8/20/2021</a:t>
+              <a:t>8/21/2021</a:t>
             </a:fld>
             <a:endParaRPr lang="en-US"/>
           </a:p>
@@ -2894,8 +2902,8 @@
         </p:nvSpPr>
         <p:spPr>
           <a:xfrm>
-            <a:off x="1133714" y="1460507"/>
-            <a:ext cx="14196060" cy="5302253"/>
+            <a:off x="1133713" y="1460508"/>
+            <a:ext cx="14196060" cy="5302254"/>
           </a:xfrm>
         </p:spPr>
         <p:txBody>
@@ -2922,8 +2930,8 @@
         </p:nvSpPr>
         <p:spPr>
           <a:xfrm>
-            <a:off x="1133716" y="6724652"/>
-            <a:ext cx="6963012" cy="3295648"/>
+            <a:off x="1133715" y="6724653"/>
+            <a:ext cx="6963012" cy="3295649"/>
           </a:xfrm>
         </p:spPr>
         <p:txBody>
@@ -2933,35 +2941,35 @@
               <a:buNone/>
               <a:defRPr sz="4320" b="1"/>
             </a:lvl1pPr>
-            <a:lvl2pPr marL="822858" indent="0">
+            <a:lvl2pPr marL="822792" indent="0">
               <a:buNone/>
               <a:defRPr sz="3600" b="1"/>
             </a:lvl2pPr>
-            <a:lvl3pPr marL="1645714" indent="0">
+            <a:lvl3pPr marL="1645583" indent="0">
               <a:buNone/>
               <a:defRPr sz="3240" b="1"/>
             </a:lvl3pPr>
-            <a:lvl4pPr marL="2468572" indent="0">
+            <a:lvl4pPr marL="2468375" indent="0">
               <a:buNone/>
               <a:defRPr sz="2880" b="1"/>
             </a:lvl4pPr>
-            <a:lvl5pPr marL="3291429" indent="0">
+            <a:lvl5pPr marL="3291165" indent="0">
               <a:buNone/>
               <a:defRPr sz="2880" b="1"/>
             </a:lvl5pPr>
-            <a:lvl6pPr marL="4114286" indent="0">
+            <a:lvl6pPr marL="4113957" indent="0">
               <a:buNone/>
               <a:defRPr sz="2880" b="1"/>
             </a:lvl6pPr>
-            <a:lvl7pPr marL="4937144" indent="0">
+            <a:lvl7pPr marL="4936749" indent="0">
               <a:buNone/>
               <a:defRPr sz="2880" b="1"/>
             </a:lvl7pPr>
-            <a:lvl8pPr marL="5760002" indent="0">
+            <a:lvl8pPr marL="5759541" indent="0">
               <a:buNone/>
               <a:defRPr sz="2880" b="1"/>
             </a:lvl8pPr>
-            <a:lvl9pPr marL="6582859" indent="0">
+            <a:lvl9pPr marL="6582332" indent="0">
               <a:buNone/>
               <a:defRPr sz="2880" b="1"/>
             </a:lvl9pPr>
@@ -2987,7 +2995,7 @@
         </p:nvSpPr>
         <p:spPr>
           <a:xfrm>
-            <a:off x="1133716" y="10020300"/>
+            <a:off x="1133715" y="10020300"/>
             <a:ext cx="6963012" cy="14738352"/>
           </a:xfrm>
         </p:spPr>
@@ -3044,8 +3052,8 @@
         </p:nvSpPr>
         <p:spPr>
           <a:xfrm>
-            <a:off x="8332471" y="6724652"/>
-            <a:ext cx="6997304" cy="3295648"/>
+            <a:off x="8332470" y="6724653"/>
+            <a:ext cx="6997305" cy="3295649"/>
           </a:xfrm>
         </p:spPr>
         <p:txBody>
@@ -3055,35 +3063,35 @@
               <a:buNone/>
               <a:defRPr sz="4320" b="1"/>
             </a:lvl1pPr>
-            <a:lvl2pPr marL="822858" indent="0">
+            <a:lvl2pPr marL="822792" indent="0">
               <a:buNone/>
               <a:defRPr sz="3600" b="1"/>
             </a:lvl2pPr>
-            <a:lvl3pPr marL="1645714" indent="0">
+            <a:lvl3pPr marL="1645583" indent="0">
               <a:buNone/>
               <a:defRPr sz="3240" b="1"/>
             </a:lvl3pPr>
-            <a:lvl4pPr marL="2468572" indent="0">
+            <a:lvl4pPr marL="2468375" indent="0">
               <a:buNone/>
               <a:defRPr sz="2880" b="1"/>
             </a:lvl4pPr>
-            <a:lvl5pPr marL="3291429" indent="0">
+            <a:lvl5pPr marL="3291165" indent="0">
               <a:buNone/>
               <a:defRPr sz="2880" b="1"/>
             </a:lvl5pPr>
-            <a:lvl6pPr marL="4114286" indent="0">
+            <a:lvl6pPr marL="4113957" indent="0">
               <a:buNone/>
               <a:defRPr sz="2880" b="1"/>
             </a:lvl6pPr>
-            <a:lvl7pPr marL="4937144" indent="0">
+            <a:lvl7pPr marL="4936749" indent="0">
               <a:buNone/>
               <a:defRPr sz="2880" b="1"/>
             </a:lvl7pPr>
-            <a:lvl8pPr marL="5760002" indent="0">
+            <a:lvl8pPr marL="5759541" indent="0">
               <a:buNone/>
               <a:defRPr sz="2880" b="1"/>
             </a:lvl8pPr>
-            <a:lvl9pPr marL="6582859" indent="0">
+            <a:lvl9pPr marL="6582332" indent="0">
               <a:buNone/>
               <a:defRPr sz="2880" b="1"/>
             </a:lvl9pPr>
@@ -3109,8 +3117,8 @@
         </p:nvSpPr>
         <p:spPr>
           <a:xfrm>
-            <a:off x="8332471" y="10020300"/>
-            <a:ext cx="6997304" cy="14738352"/>
+            <a:off x="8332470" y="10020300"/>
+            <a:ext cx="6997305" cy="14738352"/>
           </a:xfrm>
         </p:spPr>
         <p:txBody>
@@ -3171,7 +3179,7 @@
           <a:p>
             <a:fld id="{20292C77-41DF-4B3F-8776-3D22A814E10A}" type="datetimeFigureOut">
               <a:rPr lang="en-US" smtClean="0"/>
-              <a:t>8/20/2021</a:t>
+              <a:t>8/21/2021</a:t>
             </a:fld>
             <a:endParaRPr lang="en-US"/>
           </a:p>
@@ -3289,7 +3297,7 @@
           <a:p>
             <a:fld id="{20292C77-41DF-4B3F-8776-3D22A814E10A}" type="datetimeFigureOut">
               <a:rPr lang="en-US" smtClean="0"/>
-              <a:t>8/20/2021</a:t>
+              <a:t>8/21/2021</a:t>
             </a:fld>
             <a:endParaRPr lang="en-US"/>
           </a:p>
@@ -3384,7 +3392,7 @@
           <a:p>
             <a:fld id="{20292C77-41DF-4B3F-8776-3D22A814E10A}" type="datetimeFigureOut">
               <a:rPr lang="en-US" smtClean="0"/>
-              <a:t>8/20/2021</a:t>
+              <a:t>8/21/2021</a:t>
             </a:fld>
             <a:endParaRPr lang="en-US"/>
           </a:p>
@@ -3474,8 +3482,8 @@
         </p:nvSpPr>
         <p:spPr>
           <a:xfrm>
-            <a:off x="1133714" y="1828800"/>
-            <a:ext cx="5308520" cy="6400800"/>
+            <a:off x="1133716" y="1828800"/>
+            <a:ext cx="5308521" cy="6400800"/>
           </a:xfrm>
         </p:spPr>
         <p:txBody>
@@ -3506,7 +3514,7 @@
         </p:nvSpPr>
         <p:spPr>
           <a:xfrm>
-            <a:off x="6997304" y="3949706"/>
+            <a:off x="6997307" y="3949708"/>
             <a:ext cx="8332470" cy="19494500"/>
           </a:xfrm>
         </p:spPr>
@@ -3591,8 +3599,8 @@
         </p:nvSpPr>
         <p:spPr>
           <a:xfrm>
-            <a:off x="1133714" y="8229601"/>
-            <a:ext cx="5308520" cy="15246353"/>
+            <a:off x="1133716" y="8229602"/>
+            <a:ext cx="5308521" cy="15246353"/>
           </a:xfrm>
         </p:spPr>
         <p:txBody>
@@ -3602,35 +3610,35 @@
               <a:buNone/>
               <a:defRPr sz="2880"/>
             </a:lvl1pPr>
-            <a:lvl2pPr marL="822858" indent="0">
+            <a:lvl2pPr marL="822792" indent="0">
               <a:buNone/>
               <a:defRPr sz="2520"/>
             </a:lvl2pPr>
-            <a:lvl3pPr marL="1645714" indent="0">
+            <a:lvl3pPr marL="1645583" indent="0">
               <a:buNone/>
               <a:defRPr sz="2160"/>
             </a:lvl3pPr>
-            <a:lvl4pPr marL="2468572" indent="0">
+            <a:lvl4pPr marL="2468375" indent="0">
               <a:buNone/>
               <a:defRPr sz="1800"/>
             </a:lvl4pPr>
-            <a:lvl5pPr marL="3291429" indent="0">
+            <a:lvl5pPr marL="3291165" indent="0">
               <a:buNone/>
               <a:defRPr sz="1800"/>
             </a:lvl5pPr>
-            <a:lvl6pPr marL="4114286" indent="0">
+            <a:lvl6pPr marL="4113957" indent="0">
               <a:buNone/>
               <a:defRPr sz="1800"/>
             </a:lvl6pPr>
-            <a:lvl7pPr marL="4937144" indent="0">
+            <a:lvl7pPr marL="4936749" indent="0">
               <a:buNone/>
               <a:defRPr sz="1800"/>
             </a:lvl7pPr>
-            <a:lvl8pPr marL="5760002" indent="0">
+            <a:lvl8pPr marL="5759541" indent="0">
               <a:buNone/>
               <a:defRPr sz="1800"/>
             </a:lvl8pPr>
-            <a:lvl9pPr marL="6582859" indent="0">
+            <a:lvl9pPr marL="6582332" indent="0">
               <a:buNone/>
               <a:defRPr sz="1800"/>
             </a:lvl9pPr>
@@ -3661,7 +3669,7 @@
           <a:p>
             <a:fld id="{20292C77-41DF-4B3F-8776-3D22A814E10A}" type="datetimeFigureOut">
               <a:rPr lang="en-US" smtClean="0"/>
-              <a:t>8/20/2021</a:t>
+              <a:t>8/21/2021</a:t>
             </a:fld>
             <a:endParaRPr lang="en-US"/>
           </a:p>
@@ -3751,8 +3759,8 @@
         </p:nvSpPr>
         <p:spPr>
           <a:xfrm>
-            <a:off x="1133714" y="1828800"/>
-            <a:ext cx="5308520" cy="6400800"/>
+            <a:off x="1133716" y="1828800"/>
+            <a:ext cx="5308521" cy="6400800"/>
           </a:xfrm>
         </p:spPr>
         <p:txBody>
@@ -3783,7 +3791,7 @@
         </p:nvSpPr>
         <p:spPr>
           <a:xfrm>
-            <a:off x="6997304" y="3949706"/>
+            <a:off x="6997307" y="3949708"/>
             <a:ext cx="8332470" cy="19494500"/>
           </a:xfrm>
         </p:spPr>
@@ -3794,35 +3802,35 @@
               <a:buNone/>
               <a:defRPr sz="5760"/>
             </a:lvl1pPr>
-            <a:lvl2pPr marL="822858" indent="0">
+            <a:lvl2pPr marL="822792" indent="0">
               <a:buNone/>
               <a:defRPr sz="5040"/>
             </a:lvl2pPr>
-            <a:lvl3pPr marL="1645714" indent="0">
+            <a:lvl3pPr marL="1645583" indent="0">
               <a:buNone/>
               <a:defRPr sz="4320"/>
             </a:lvl3pPr>
-            <a:lvl4pPr marL="2468572" indent="0">
+            <a:lvl4pPr marL="2468375" indent="0">
               <a:buNone/>
               <a:defRPr sz="3600"/>
             </a:lvl4pPr>
-            <a:lvl5pPr marL="3291429" indent="0">
+            <a:lvl5pPr marL="3291165" indent="0">
               <a:buNone/>
               <a:defRPr sz="3600"/>
             </a:lvl5pPr>
-            <a:lvl6pPr marL="4114286" indent="0">
+            <a:lvl6pPr marL="4113957" indent="0">
               <a:buNone/>
               <a:defRPr sz="3600"/>
             </a:lvl6pPr>
-            <a:lvl7pPr marL="4937144" indent="0">
+            <a:lvl7pPr marL="4936749" indent="0">
               <a:buNone/>
               <a:defRPr sz="3600"/>
             </a:lvl7pPr>
-            <a:lvl8pPr marL="5760002" indent="0">
+            <a:lvl8pPr marL="5759541" indent="0">
               <a:buNone/>
               <a:defRPr sz="3600"/>
             </a:lvl8pPr>
-            <a:lvl9pPr marL="6582859" indent="0">
+            <a:lvl9pPr marL="6582332" indent="0">
               <a:buNone/>
               <a:defRPr sz="3600"/>
             </a:lvl9pPr>
@@ -3848,8 +3856,8 @@
         </p:nvSpPr>
         <p:spPr>
           <a:xfrm>
-            <a:off x="1133714" y="8229601"/>
-            <a:ext cx="5308520" cy="15246353"/>
+            <a:off x="1133716" y="8229602"/>
+            <a:ext cx="5308521" cy="15246353"/>
           </a:xfrm>
         </p:spPr>
         <p:txBody>
@@ -3859,35 +3867,35 @@
               <a:buNone/>
               <a:defRPr sz="2880"/>
             </a:lvl1pPr>
-            <a:lvl2pPr marL="822858" indent="0">
+            <a:lvl2pPr marL="822792" indent="0">
               <a:buNone/>
               <a:defRPr sz="2520"/>
             </a:lvl2pPr>
-            <a:lvl3pPr marL="1645714" indent="0">
+            <a:lvl3pPr marL="1645583" indent="0">
               <a:buNone/>
               <a:defRPr sz="2160"/>
             </a:lvl3pPr>
-            <a:lvl4pPr marL="2468572" indent="0">
+            <a:lvl4pPr marL="2468375" indent="0">
               <a:buNone/>
               <a:defRPr sz="1800"/>
             </a:lvl4pPr>
-            <a:lvl5pPr marL="3291429" indent="0">
+            <a:lvl5pPr marL="3291165" indent="0">
               <a:buNone/>
               <a:defRPr sz="1800"/>
             </a:lvl5pPr>
-            <a:lvl6pPr marL="4114286" indent="0">
+            <a:lvl6pPr marL="4113957" indent="0">
               <a:buNone/>
               <a:defRPr sz="1800"/>
             </a:lvl6pPr>
-            <a:lvl7pPr marL="4937144" indent="0">
+            <a:lvl7pPr marL="4936749" indent="0">
               <a:buNone/>
               <a:defRPr sz="1800"/>
             </a:lvl7pPr>
-            <a:lvl8pPr marL="5760002" indent="0">
+            <a:lvl8pPr marL="5759541" indent="0">
               <a:buNone/>
               <a:defRPr sz="1800"/>
             </a:lvl8pPr>
-            <a:lvl9pPr marL="6582859" indent="0">
+            <a:lvl9pPr marL="6582332" indent="0">
               <a:buNone/>
               <a:defRPr sz="1800"/>
             </a:lvl9pPr>
@@ -3918,7 +3926,7 @@
           <a:p>
             <a:fld id="{20292C77-41DF-4B3F-8776-3D22A814E10A}" type="datetimeFigureOut">
               <a:rPr lang="en-US" smtClean="0"/>
-              <a:t>8/20/2021</a:t>
+              <a:t>8/21/2021</a:t>
             </a:fld>
             <a:endParaRPr lang="en-US"/>
           </a:p>
@@ -4013,8 +4021,8 @@
         </p:nvSpPr>
         <p:spPr>
           <a:xfrm>
-            <a:off x="1131570" y="1460507"/>
-            <a:ext cx="14196060" cy="5302253"/>
+            <a:off x="1131570" y="1460508"/>
+            <a:ext cx="14196060" cy="5302254"/>
           </a:xfrm>
           <a:prstGeom prst="rect">
             <a:avLst/>
@@ -4108,8 +4116,8 @@
         </p:nvSpPr>
         <p:spPr>
           <a:xfrm>
-            <a:off x="1131570" y="25425406"/>
-            <a:ext cx="3703320" cy="1460500"/>
+            <a:off x="1131570" y="25425408"/>
+            <a:ext cx="3703321" cy="1460500"/>
           </a:xfrm>
           <a:prstGeom prst="rect">
             <a:avLst/>
@@ -4131,7 +4139,7 @@
           <a:p>
             <a:fld id="{20292C77-41DF-4B3F-8776-3D22A814E10A}" type="datetimeFigureOut">
               <a:rPr lang="en-US" smtClean="0"/>
-              <a:t>8/20/2021</a:t>
+              <a:t>8/21/2021</a:t>
             </a:fld>
             <a:endParaRPr lang="en-US"/>
           </a:p>
@@ -4149,8 +4157,8 @@
         </p:nvSpPr>
         <p:spPr>
           <a:xfrm>
-            <a:off x="5452110" y="25425406"/>
-            <a:ext cx="5554980" cy="1460500"/>
+            <a:off x="5452114" y="25425408"/>
+            <a:ext cx="5554979" cy="1460500"/>
           </a:xfrm>
           <a:prstGeom prst="rect">
             <a:avLst/>
@@ -4186,8 +4194,8 @@
         </p:nvSpPr>
         <p:spPr>
           <a:xfrm>
-            <a:off x="11624310" y="25425406"/>
-            <a:ext cx="3703320" cy="1460500"/>
+            <a:off x="11624309" y="25425408"/>
+            <a:ext cx="3703321" cy="1460500"/>
           </a:xfrm>
           <a:prstGeom prst="rect">
             <a:avLst/>
@@ -4238,7 +4246,7 @@
   </p:sldLayoutIdLst>
   <p:txStyles>
     <p:titleStyle>
-      <a:lvl1pPr algn="l" defTabSz="1645714" rtl="0" eaLnBrk="1" latinLnBrk="0" hangingPunct="1">
+      <a:lvl1pPr algn="l" defTabSz="1645583" rtl="0" eaLnBrk="1" latinLnBrk="0" hangingPunct="1">
         <a:lnSpc>
           <a:spcPct val="90000"/>
         </a:lnSpc>
@@ -4257,7 +4265,7 @@
       </a:lvl1pPr>
     </p:titleStyle>
     <p:bodyStyle>
-      <a:lvl1pPr marL="411428" indent="-411428" algn="l" defTabSz="1645714" rtl="0" eaLnBrk="1" latinLnBrk="0" hangingPunct="1">
+      <a:lvl1pPr marL="411395" indent="-411395" algn="l" defTabSz="1645583" rtl="0" eaLnBrk="1" latinLnBrk="0" hangingPunct="1">
         <a:lnSpc>
           <a:spcPct val="90000"/>
         </a:lnSpc>
@@ -4275,7 +4283,7 @@
           <a:cs typeface="+mn-cs"/>
         </a:defRPr>
       </a:lvl1pPr>
-      <a:lvl2pPr marL="1234286" indent="-411428" algn="l" defTabSz="1645714" rtl="0" eaLnBrk="1" latinLnBrk="0" hangingPunct="1">
+      <a:lvl2pPr marL="1234187" indent="-411395" algn="l" defTabSz="1645583" rtl="0" eaLnBrk="1" latinLnBrk="0" hangingPunct="1">
         <a:lnSpc>
           <a:spcPct val="90000"/>
         </a:lnSpc>
@@ -4293,7 +4301,7 @@
           <a:cs typeface="+mn-cs"/>
         </a:defRPr>
       </a:lvl2pPr>
-      <a:lvl3pPr marL="2057143" indent="-411428" algn="l" defTabSz="1645714" rtl="0" eaLnBrk="1" latinLnBrk="0" hangingPunct="1">
+      <a:lvl3pPr marL="2056979" indent="-411395" algn="l" defTabSz="1645583" rtl="0" eaLnBrk="1" latinLnBrk="0" hangingPunct="1">
         <a:lnSpc>
           <a:spcPct val="90000"/>
         </a:lnSpc>
@@ -4311,7 +4319,7 @@
           <a:cs typeface="+mn-cs"/>
         </a:defRPr>
       </a:lvl3pPr>
-      <a:lvl4pPr marL="2880000" indent="-411428" algn="l" defTabSz="1645714" rtl="0" eaLnBrk="1" latinLnBrk="0" hangingPunct="1">
+      <a:lvl4pPr marL="2879770" indent="-411395" algn="l" defTabSz="1645583" rtl="0" eaLnBrk="1" latinLnBrk="0" hangingPunct="1">
         <a:lnSpc>
           <a:spcPct val="90000"/>
         </a:lnSpc>
@@ -4329,7 +4337,7 @@
           <a:cs typeface="+mn-cs"/>
         </a:defRPr>
       </a:lvl4pPr>
-      <a:lvl5pPr marL="3702858" indent="-411428" algn="l" defTabSz="1645714" rtl="0" eaLnBrk="1" latinLnBrk="0" hangingPunct="1">
+      <a:lvl5pPr marL="3702562" indent="-411395" algn="l" defTabSz="1645583" rtl="0" eaLnBrk="1" latinLnBrk="0" hangingPunct="1">
         <a:lnSpc>
           <a:spcPct val="90000"/>
         </a:lnSpc>
@@ -4347,7 +4355,7 @@
           <a:cs typeface="+mn-cs"/>
         </a:defRPr>
       </a:lvl5pPr>
-      <a:lvl6pPr marL="4525716" indent="-411428" algn="l" defTabSz="1645714" rtl="0" eaLnBrk="1" latinLnBrk="0" hangingPunct="1">
+      <a:lvl6pPr marL="4525356" indent="-411395" algn="l" defTabSz="1645583" rtl="0" eaLnBrk="1" latinLnBrk="0" hangingPunct="1">
         <a:lnSpc>
           <a:spcPct val="90000"/>
         </a:lnSpc>
@@ -4365,7 +4373,7 @@
           <a:cs typeface="+mn-cs"/>
         </a:defRPr>
       </a:lvl6pPr>
-      <a:lvl7pPr marL="5348573" indent="-411428" algn="l" defTabSz="1645714" rtl="0" eaLnBrk="1" latinLnBrk="0" hangingPunct="1">
+      <a:lvl7pPr marL="5348144" indent="-411395" algn="l" defTabSz="1645583" rtl="0" eaLnBrk="1" latinLnBrk="0" hangingPunct="1">
         <a:lnSpc>
           <a:spcPct val="90000"/>
         </a:lnSpc>
@@ -4383,7 +4391,7 @@
           <a:cs typeface="+mn-cs"/>
         </a:defRPr>
       </a:lvl7pPr>
-      <a:lvl8pPr marL="6171430" indent="-411428" algn="l" defTabSz="1645714" rtl="0" eaLnBrk="1" latinLnBrk="0" hangingPunct="1">
+      <a:lvl8pPr marL="6170936" indent="-411395" algn="l" defTabSz="1645583" rtl="0" eaLnBrk="1" latinLnBrk="0" hangingPunct="1">
         <a:lnSpc>
           <a:spcPct val="90000"/>
         </a:lnSpc>
@@ -4401,7 +4409,7 @@
           <a:cs typeface="+mn-cs"/>
         </a:defRPr>
       </a:lvl8pPr>
-      <a:lvl9pPr marL="6994288" indent="-411428" algn="l" defTabSz="1645714" rtl="0" eaLnBrk="1" latinLnBrk="0" hangingPunct="1">
+      <a:lvl9pPr marL="6993729" indent="-411395" algn="l" defTabSz="1645583" rtl="0" eaLnBrk="1" latinLnBrk="0" hangingPunct="1">
         <a:lnSpc>
           <a:spcPct val="90000"/>
         </a:lnSpc>
@@ -4424,7 +4432,7 @@
       <a:defPPr>
         <a:defRPr lang="en-US"/>
       </a:defPPr>
-      <a:lvl1pPr marL="0" algn="l" defTabSz="1645714" rtl="0" eaLnBrk="1" latinLnBrk="0" hangingPunct="1">
+      <a:lvl1pPr marL="0" algn="l" defTabSz="1645583" rtl="0" eaLnBrk="1" latinLnBrk="0" hangingPunct="1">
         <a:defRPr sz="3240" kern="1200">
           <a:solidFill>
             <a:schemeClr val="tx1"/>
@@ -4434,7 +4442,7 @@
           <a:cs typeface="+mn-cs"/>
         </a:defRPr>
       </a:lvl1pPr>
-      <a:lvl2pPr marL="822858" algn="l" defTabSz="1645714" rtl="0" eaLnBrk="1" latinLnBrk="0" hangingPunct="1">
+      <a:lvl2pPr marL="822792" algn="l" defTabSz="1645583" rtl="0" eaLnBrk="1" latinLnBrk="0" hangingPunct="1">
         <a:defRPr sz="3240" kern="1200">
           <a:solidFill>
             <a:schemeClr val="tx1"/>
@@ -4444,7 +4452,7 @@
           <a:cs typeface="+mn-cs"/>
         </a:defRPr>
       </a:lvl2pPr>
-      <a:lvl3pPr marL="1645714" algn="l" defTabSz="1645714" rtl="0" eaLnBrk="1" latinLnBrk="0" hangingPunct="1">
+      <a:lvl3pPr marL="1645583" algn="l" defTabSz="1645583" rtl="0" eaLnBrk="1" latinLnBrk="0" hangingPunct="1">
         <a:defRPr sz="3240" kern="1200">
           <a:solidFill>
             <a:schemeClr val="tx1"/>
@@ -4454,7 +4462,7 @@
           <a:cs typeface="+mn-cs"/>
         </a:defRPr>
       </a:lvl3pPr>
-      <a:lvl4pPr marL="2468572" algn="l" defTabSz="1645714" rtl="0" eaLnBrk="1" latinLnBrk="0" hangingPunct="1">
+      <a:lvl4pPr marL="2468375" algn="l" defTabSz="1645583" rtl="0" eaLnBrk="1" latinLnBrk="0" hangingPunct="1">
         <a:defRPr sz="3240" kern="1200">
           <a:solidFill>
             <a:schemeClr val="tx1"/>
@@ -4464,7 +4472,7 @@
           <a:cs typeface="+mn-cs"/>
         </a:defRPr>
       </a:lvl4pPr>
-      <a:lvl5pPr marL="3291429" algn="l" defTabSz="1645714" rtl="0" eaLnBrk="1" latinLnBrk="0" hangingPunct="1">
+      <a:lvl5pPr marL="3291165" algn="l" defTabSz="1645583" rtl="0" eaLnBrk="1" latinLnBrk="0" hangingPunct="1">
         <a:defRPr sz="3240" kern="1200">
           <a:solidFill>
             <a:schemeClr val="tx1"/>
@@ -4474,7 +4482,7 @@
           <a:cs typeface="+mn-cs"/>
         </a:defRPr>
       </a:lvl5pPr>
-      <a:lvl6pPr marL="4114286" algn="l" defTabSz="1645714" rtl="0" eaLnBrk="1" latinLnBrk="0" hangingPunct="1">
+      <a:lvl6pPr marL="4113957" algn="l" defTabSz="1645583" rtl="0" eaLnBrk="1" latinLnBrk="0" hangingPunct="1">
         <a:defRPr sz="3240" kern="1200">
           <a:solidFill>
             <a:schemeClr val="tx1"/>
@@ -4484,7 +4492,7 @@
           <a:cs typeface="+mn-cs"/>
         </a:defRPr>
       </a:lvl6pPr>
-      <a:lvl7pPr marL="4937144" algn="l" defTabSz="1645714" rtl="0" eaLnBrk="1" latinLnBrk="0" hangingPunct="1">
+      <a:lvl7pPr marL="4936749" algn="l" defTabSz="1645583" rtl="0" eaLnBrk="1" latinLnBrk="0" hangingPunct="1">
         <a:defRPr sz="3240" kern="1200">
           <a:solidFill>
             <a:schemeClr val="tx1"/>
@@ -4494,7 +4502,7 @@
           <a:cs typeface="+mn-cs"/>
         </a:defRPr>
       </a:lvl7pPr>
-      <a:lvl8pPr marL="5760002" algn="l" defTabSz="1645714" rtl="0" eaLnBrk="1" latinLnBrk="0" hangingPunct="1">
+      <a:lvl8pPr marL="5759541" algn="l" defTabSz="1645583" rtl="0" eaLnBrk="1" latinLnBrk="0" hangingPunct="1">
         <a:defRPr sz="3240" kern="1200">
           <a:solidFill>
             <a:schemeClr val="tx1"/>
@@ -4504,7 +4512,7 @@
           <a:cs typeface="+mn-cs"/>
         </a:defRPr>
       </a:lvl8pPr>
-      <a:lvl9pPr marL="6582859" algn="l" defTabSz="1645714" rtl="0" eaLnBrk="1" latinLnBrk="0" hangingPunct="1">
+      <a:lvl9pPr marL="6582332" algn="l" defTabSz="1645583" rtl="0" eaLnBrk="1" latinLnBrk="0" hangingPunct="1">
         <a:defRPr sz="3240" kern="1200">
           <a:solidFill>
             <a:schemeClr val="tx1"/>
@@ -4550,8 +4558,8 @@
         </p:nvSpPr>
         <p:spPr>
           <a:xfrm>
-            <a:off x="4307" y="3"/>
-            <a:ext cx="16459200" cy="876301"/>
+            <a:off x="4306" y="3"/>
+            <a:ext cx="16459201" cy="876302"/>
           </a:xfrm>
           <a:prstGeom prst="rect">
             <a:avLst/>
@@ -4586,7 +4594,7 @@
           <a:lstStyle/>
           <a:p>
             <a:pPr algn="ctr"/>
-            <a:endParaRPr lang="en-US" dirty="0"/>
+            <a:endParaRPr lang="en-US" sz="1125" dirty="0"/>
           </a:p>
         </p:txBody>
       </p:sp>
@@ -4604,7 +4612,7 @@
         </p:nvSpPr>
         <p:spPr>
           <a:xfrm>
-            <a:off x="1345998" y="1172006"/>
+            <a:off x="1345998" y="1172008"/>
             <a:ext cx="4949241" cy="757130"/>
           </a:xfrm>
           <a:prstGeom prst="rect">
@@ -4645,7 +4653,7 @@
         </p:nvSpPr>
         <p:spPr>
           <a:xfrm>
-            <a:off x="507795" y="251278"/>
+            <a:off x="507795" y="251281"/>
             <a:ext cx="2042248" cy="400110"/>
           </a:xfrm>
           <a:prstGeom prst="rect">
@@ -4698,7 +4706,7 @@
         </p:nvSpPr>
         <p:spPr>
           <a:xfrm>
-            <a:off x="3328426" y="282056"/>
+            <a:off x="3328426" y="282059"/>
             <a:ext cx="3002533" cy="338554"/>
           </a:xfrm>
           <a:prstGeom prst="rect">
@@ -4762,8 +4770,8 @@
         </p:nvSpPr>
         <p:spPr>
           <a:xfrm>
-            <a:off x="13298352" y="282056"/>
-            <a:ext cx="2509268" cy="369332"/>
+            <a:off x="13298354" y="282057"/>
+            <a:ext cx="2509268" cy="369331"/>
           </a:xfrm>
           <a:prstGeom prst="roundRect">
             <a:avLst>
@@ -4828,8 +4836,8 @@
           </p:nvPr>
         </p:nvGraphicFramePr>
         <p:xfrm>
-          <a:off x="1733067" y="2004124"/>
-          <a:ext cx="12933106" cy="3306101"/>
+          <a:off x="1733067" y="2004125"/>
+          <a:ext cx="12933104" cy="3306105"/>
         </p:xfrm>
         <a:graphic>
           <a:graphicData uri="http://schemas.openxmlformats.org/drawingml/2006/table">
@@ -4838,28 +4846,28 @@
                 <a:tableStyleId>{5C22544A-7EE6-4342-B048-85BDC9FD1C3A}</a:tableStyleId>
               </a:tblPr>
               <a:tblGrid>
-                <a:gridCol w="1274950">
+                <a:gridCol w="1274951">
                   <a:extLst>
                     <a:ext uri="{9D8B030D-6E8A-4147-A177-3AD203B41FA5}">
                       <a16:colId xmlns:a16="http://schemas.microsoft.com/office/drawing/2014/main" val="3262025580"/>
                     </a:ext>
                   </a:extLst>
                 </a:gridCol>
-                <a:gridCol w="1150112">
+                <a:gridCol w="1150111">
                   <a:extLst>
                     <a:ext uri="{9D8B030D-6E8A-4147-A177-3AD203B41FA5}">
                       <a16:colId xmlns:a16="http://schemas.microsoft.com/office/drawing/2014/main" val="545015703"/>
                     </a:ext>
                   </a:extLst>
                 </a:gridCol>
-                <a:gridCol w="1206614">
+                <a:gridCol w="1206615">
                   <a:extLst>
                     <a:ext uri="{9D8B030D-6E8A-4147-A177-3AD203B41FA5}">
                       <a16:colId xmlns:a16="http://schemas.microsoft.com/office/drawing/2014/main" val="1356807224"/>
                     </a:ext>
                   </a:extLst>
                 </a:gridCol>
-                <a:gridCol w="1181446">
+                <a:gridCol w="1181445">
                   <a:extLst>
                     <a:ext uri="{9D8B030D-6E8A-4147-A177-3AD203B41FA5}">
                       <a16:colId xmlns:a16="http://schemas.microsoft.com/office/drawing/2014/main" val="3734473160"/>
@@ -4887,14 +4895,14 @@
                     </a:ext>
                   </a:extLst>
                 </a:gridCol>
-                <a:gridCol w="1112990">
+                <a:gridCol w="1112989">
                   <a:extLst>
                     <a:ext uri="{9D8B030D-6E8A-4147-A177-3AD203B41FA5}">
                       <a16:colId xmlns:a16="http://schemas.microsoft.com/office/drawing/2014/main" val="2271035021"/>
                     </a:ext>
                   </a:extLst>
                 </a:gridCol>
-                <a:gridCol w="1167668">
+                <a:gridCol w="1167667">
                   <a:extLst>
                     <a:ext uri="{9D8B030D-6E8A-4147-A177-3AD203B41FA5}">
                       <a16:colId xmlns:a16="http://schemas.microsoft.com/office/drawing/2014/main" val="157837607"/>
@@ -4931,7 +4939,7 @@
                       </a:endParaRPr>
                     </a:p>
                   </a:txBody>
-                  <a:tcPr marR="182880" marT="91440" marB="91440" anchor="ctr">
+                  <a:tcPr marR="182881" marT="91440" marB="91440" anchor="ctr">
                     <a:lnL w="12700" cap="flat" cmpd="sng" algn="ctr">
                       <a:noFill/>
                       <a:prstDash val="solid"/>
@@ -5533,7 +5541,7 @@
                       </a:r>
                     </a:p>
                   </a:txBody>
-                  <a:tcPr marR="182880" marT="91440" marB="91440" anchor="ctr">
+                  <a:tcPr marR="182881" marT="91440" marB="91440" anchor="ctr">
                     <a:lnL w="12700" cap="flat" cmpd="sng" algn="ctr">
                       <a:noFill/>
                       <a:prstDash val="solid"/>
@@ -5579,7 +5587,7 @@
                   </a:ext>
                 </a:extLst>
               </a:tr>
-              <a:tr h="676656">
+              <a:tr h="676657">
                 <a:tc>
                   <a:txBody>
                     <a:bodyPr/>
@@ -5613,7 +5621,7 @@
                       </a:r>
                     </a:p>
                   </a:txBody>
-                  <a:tcPr marR="182880" marT="91440" marB="91440" anchor="ctr">
+                  <a:tcPr marR="182881" marT="91440" marB="91440" anchor="ctr">
                     <a:lnL w="12700" cap="flat" cmpd="sng" algn="ctr">
                       <a:noFill/>
                       <a:prstDash val="solid"/>
@@ -5653,7 +5661,7 @@
                       <a:endParaRPr lang="en-US" sz="3200" dirty="0"/>
                     </a:p>
                   </a:txBody>
-                  <a:tcPr marR="182880" marT="91440" marB="91440">
+                  <a:tcPr marR="182881" marT="91440" marB="91440">
                     <a:lnL w="12700" cap="flat" cmpd="sng" algn="ctr">
                       <a:noFill/>
                       <a:prstDash val="solid"/>
@@ -5697,7 +5705,7 @@
                       <a:endParaRPr lang="en-US" sz="3200" dirty="0"/>
                     </a:p>
                   </a:txBody>
-                  <a:tcPr marR="182880" marT="91440" marB="91440">
+                  <a:tcPr marR="182881" marT="91440" marB="91440">
                     <a:lnL w="12700" cap="flat" cmpd="sng" algn="ctr">
                       <a:solidFill>
                         <a:schemeClr val="accent3"/>
@@ -5743,7 +5751,7 @@
                       <a:endParaRPr lang="en-US" sz="3200" dirty="0"/>
                     </a:p>
                   </a:txBody>
-                  <a:tcPr marR="182880" marT="91440" marB="91440">
+                  <a:tcPr marR="182881" marT="91440" marB="91440">
                     <a:lnL w="12700" cap="flat" cmpd="sng" algn="ctr">
                       <a:solidFill>
                         <a:schemeClr val="accent3"/>
@@ -5789,7 +5797,7 @@
                       <a:endParaRPr lang="en-US" sz="3200" dirty="0"/>
                     </a:p>
                   </a:txBody>
-                  <a:tcPr marR="182880" marT="91440" marB="91440">
+                  <a:tcPr marR="182881" marT="91440" marB="91440">
                     <a:lnL w="12700" cap="flat" cmpd="sng" algn="ctr">
                       <a:solidFill>
                         <a:schemeClr val="accent3"/>
@@ -5835,7 +5843,7 @@
                       <a:endParaRPr lang="en-US" sz="3200" dirty="0"/>
                     </a:p>
                   </a:txBody>
-                  <a:tcPr marR="182880" marT="91440" marB="91440">
+                  <a:tcPr marR="182881" marT="91440" marB="91440">
                     <a:lnL w="12700" cap="flat" cmpd="sng" algn="ctr">
                       <a:solidFill>
                         <a:schemeClr val="accent3"/>
@@ -5881,7 +5889,7 @@
                       <a:endParaRPr lang="en-US" sz="3200" dirty="0"/>
                     </a:p>
                   </a:txBody>
-                  <a:tcPr marR="182880" marT="91440" marB="91440">
+                  <a:tcPr marR="182881" marT="91440" marB="91440">
                     <a:lnL w="12700" cap="flat" cmpd="sng" algn="ctr">
                       <a:solidFill>
                         <a:schemeClr val="accent3"/>
@@ -5927,7 +5935,7 @@
                       <a:endParaRPr lang="en-US" sz="3200" dirty="0"/>
                     </a:p>
                   </a:txBody>
-                  <a:tcPr marR="182880" marT="91440" marB="91440">
+                  <a:tcPr marR="182881" marT="91440" marB="91440">
                     <a:lnL w="12700" cap="flat" cmpd="sng" algn="ctr">
                       <a:solidFill>
                         <a:schemeClr val="accent3"/>
@@ -5973,7 +5981,7 @@
                       <a:endParaRPr lang="en-US" sz="3200" dirty="0"/>
                     </a:p>
                   </a:txBody>
-                  <a:tcPr marR="182880" marT="91440" marB="91440">
+                  <a:tcPr marR="182881" marT="91440" marB="91440">
                     <a:lnL w="12700" cap="flat" cmpd="sng" algn="ctr">
                       <a:solidFill>
                         <a:schemeClr val="accent3"/>
@@ -6022,7 +6030,7 @@
                       <a:endParaRPr lang="en-US" sz="3200" dirty="0"/>
                     </a:p>
                   </a:txBody>
-                  <a:tcPr marR="182880" marT="91440" marB="91440">
+                  <a:tcPr marR="182881" marT="91440" marB="91440">
                     <a:lnL w="12700" cap="flat" cmpd="sng" algn="ctr">
                       <a:solidFill>
                         <a:schemeClr val="accent3"/>
@@ -6077,7 +6085,7 @@
                       </a:r>
                     </a:p>
                   </a:txBody>
-                  <a:tcPr marR="182880" marT="91440" marB="91440" anchor="ctr">
+                  <a:tcPr marR="182881" marT="91440" marB="91440" anchor="ctr">
                     <a:lnL w="12700" cap="flat" cmpd="sng" algn="ctr">
                       <a:solidFill>
                         <a:schemeClr val="accent3"/>
@@ -6117,7 +6125,7 @@
                   </a:ext>
                 </a:extLst>
               </a:tr>
-              <a:tr h="676656">
+              <a:tr h="676657">
                 <a:tc>
                   <a:txBody>
                     <a:bodyPr/>
@@ -6135,7 +6143,7 @@
                       </a:r>
                     </a:p>
                   </a:txBody>
-                  <a:tcPr marR="182880" marT="91440" marB="91440" anchor="ctr">
+                  <a:tcPr marR="182881" marT="91440" marB="91440" anchor="ctr">
                     <a:lnL w="12700" cap="flat" cmpd="sng" algn="ctr">
                       <a:noFill/>
                       <a:prstDash val="solid"/>
@@ -6175,7 +6183,7 @@
                       <a:endParaRPr lang="en-US" sz="3200" dirty="0"/>
                     </a:p>
                   </a:txBody>
-                  <a:tcPr marR="182880" marT="91440" marB="91440">
+                  <a:tcPr marR="182881" marT="91440" marB="91440">
                     <a:lnL w="12700" cap="flat" cmpd="sng" algn="ctr">
                       <a:noFill/>
                       <a:prstDash val="solid"/>
@@ -6219,7 +6227,7 @@
                       <a:endParaRPr lang="en-US" sz="3200" dirty="0"/>
                     </a:p>
                   </a:txBody>
-                  <a:tcPr marR="182880" marT="91440" marB="91440">
+                  <a:tcPr marR="182881" marT="91440" marB="91440">
                     <a:lnL w="12700" cap="flat" cmpd="sng" algn="ctr">
                       <a:solidFill>
                         <a:schemeClr val="accent3"/>
@@ -6265,7 +6273,7 @@
                       <a:endParaRPr lang="en-US" sz="3200" dirty="0"/>
                     </a:p>
                   </a:txBody>
-                  <a:tcPr marR="182880" marT="91440" marB="91440">
+                  <a:tcPr marR="182881" marT="91440" marB="91440">
                     <a:lnL w="12700" cap="flat" cmpd="sng" algn="ctr">
                       <a:solidFill>
                         <a:schemeClr val="accent3"/>
@@ -6311,7 +6319,7 @@
                       <a:endParaRPr lang="en-US" sz="3200" dirty="0"/>
                     </a:p>
                   </a:txBody>
-                  <a:tcPr marR="182880" marT="91440" marB="91440">
+                  <a:tcPr marR="182881" marT="91440" marB="91440">
                     <a:lnL w="12700" cap="flat" cmpd="sng" algn="ctr">
                       <a:solidFill>
                         <a:schemeClr val="accent3"/>
@@ -6357,7 +6365,7 @@
                       <a:endParaRPr lang="en-US" sz="3200" dirty="0"/>
                     </a:p>
                   </a:txBody>
-                  <a:tcPr marR="182880" marT="91440" marB="91440">
+                  <a:tcPr marR="182881" marT="91440" marB="91440">
                     <a:lnL w="12700" cap="flat" cmpd="sng" algn="ctr">
                       <a:solidFill>
                         <a:schemeClr val="accent3"/>
@@ -6403,7 +6411,7 @@
                       <a:endParaRPr lang="en-US" sz="3200" dirty="0"/>
                     </a:p>
                   </a:txBody>
-                  <a:tcPr marR="182880" marT="91440" marB="91440">
+                  <a:tcPr marR="182881" marT="91440" marB="91440">
                     <a:lnL w="12700" cap="flat" cmpd="sng" algn="ctr">
                       <a:solidFill>
                         <a:schemeClr val="accent3"/>
@@ -6449,7 +6457,7 @@
                       <a:endParaRPr lang="en-US" sz="3200" dirty="0"/>
                     </a:p>
                   </a:txBody>
-                  <a:tcPr marR="182880" marT="91440" marB="91440">
+                  <a:tcPr marR="182881" marT="91440" marB="91440">
                     <a:lnL w="12700" cap="flat" cmpd="sng" algn="ctr">
                       <a:solidFill>
                         <a:schemeClr val="accent3"/>
@@ -6495,7 +6503,7 @@
                       <a:endParaRPr lang="en-US" sz="3200" dirty="0"/>
                     </a:p>
                   </a:txBody>
-                  <a:tcPr marR="182880" marT="91440" marB="91440">
+                  <a:tcPr marR="182881" marT="91440" marB="91440">
                     <a:lnL w="12700" cap="flat" cmpd="sng" algn="ctr">
                       <a:solidFill>
                         <a:schemeClr val="accent3"/>
@@ -6544,7 +6552,7 @@
                       <a:endParaRPr lang="en-US" sz="3200" dirty="0"/>
                     </a:p>
                   </a:txBody>
-                  <a:tcPr marR="182880" marT="91440" marB="91440">
+                  <a:tcPr marR="182881" marT="91440" marB="91440">
                     <a:lnL w="12700" cap="flat" cmpd="sng" algn="ctr">
                       <a:solidFill>
                         <a:schemeClr val="accent3"/>
@@ -6599,7 +6607,7 @@
                       </a:r>
                     </a:p>
                   </a:txBody>
-                  <a:tcPr marR="182880" marT="91440" marB="91440" anchor="ctr">
+                  <a:tcPr marR="182881" marT="91440" marB="91440" anchor="ctr">
                     <a:lnL w="12700" cap="flat" cmpd="sng" algn="ctr">
                       <a:solidFill>
                         <a:schemeClr val="accent3"/>
@@ -6639,7 +6647,7 @@
                   </a:ext>
                 </a:extLst>
               </a:tr>
-              <a:tr h="676656">
+              <a:tr h="676657">
                 <a:tc>
                   <a:txBody>
                     <a:bodyPr/>
@@ -6657,7 +6665,7 @@
                       </a:r>
                     </a:p>
                   </a:txBody>
-                  <a:tcPr marR="182880" marT="91440" marB="91440" anchor="ctr">
+                  <a:tcPr marR="182881" marT="91440" marB="91440" anchor="ctr">
                     <a:lnL w="12700" cap="flat" cmpd="sng" algn="ctr">
                       <a:noFill/>
                       <a:prstDash val="solid"/>
@@ -6697,7 +6705,7 @@
                       <a:endParaRPr lang="en-US" sz="3200" dirty="0"/>
                     </a:p>
                   </a:txBody>
-                  <a:tcPr marR="182880" marT="91440" marB="91440">
+                  <a:tcPr marR="182881" marT="91440" marB="91440">
                     <a:lnL w="12700" cap="flat" cmpd="sng" algn="ctr">
                       <a:noFill/>
                       <a:prstDash val="solid"/>
@@ -6741,7 +6749,7 @@
                       <a:endParaRPr lang="en-US" sz="3200" dirty="0"/>
                     </a:p>
                   </a:txBody>
-                  <a:tcPr marR="182880" marT="91440" marB="91440">
+                  <a:tcPr marR="182881" marT="91440" marB="91440">
                     <a:lnL w="12700" cap="flat" cmpd="sng" algn="ctr">
                       <a:solidFill>
                         <a:schemeClr val="accent3"/>
@@ -6787,7 +6795,7 @@
                       <a:endParaRPr lang="en-US" sz="3200" dirty="0"/>
                     </a:p>
                   </a:txBody>
-                  <a:tcPr marR="182880" marT="91440" marB="91440">
+                  <a:tcPr marR="182881" marT="91440" marB="91440">
                     <a:lnL w="12700" cap="flat" cmpd="sng" algn="ctr">
                       <a:solidFill>
                         <a:schemeClr val="accent3"/>
@@ -6833,7 +6841,7 @@
                       <a:endParaRPr lang="en-US" sz="3200" dirty="0"/>
                     </a:p>
                   </a:txBody>
-                  <a:tcPr marR="182880" marT="91440" marB="91440">
+                  <a:tcPr marR="182881" marT="91440" marB="91440">
                     <a:lnL w="12700" cap="flat" cmpd="sng" algn="ctr">
                       <a:solidFill>
                         <a:schemeClr val="accent3"/>
@@ -6879,7 +6887,7 @@
                       <a:endParaRPr lang="en-US" sz="3200" dirty="0"/>
                     </a:p>
                   </a:txBody>
-                  <a:tcPr marR="182880" marT="91440" marB="91440">
+                  <a:tcPr marR="182881" marT="91440" marB="91440">
                     <a:lnL w="12700" cap="flat" cmpd="sng" algn="ctr">
                       <a:solidFill>
                         <a:schemeClr val="accent3"/>
@@ -6925,7 +6933,7 @@
                       <a:endParaRPr lang="en-US" sz="3200" dirty="0"/>
                     </a:p>
                   </a:txBody>
-                  <a:tcPr marR="182880" marT="91440" marB="91440">
+                  <a:tcPr marR="182881" marT="91440" marB="91440">
                     <a:lnL w="12700" cap="flat" cmpd="sng" algn="ctr">
                       <a:solidFill>
                         <a:schemeClr val="accent3"/>
@@ -6971,7 +6979,7 @@
                       <a:endParaRPr lang="en-US" sz="3200" dirty="0"/>
                     </a:p>
                   </a:txBody>
-                  <a:tcPr marR="182880" marT="91440" marB="91440">
+                  <a:tcPr marR="182881" marT="91440" marB="91440">
                     <a:lnL w="12700" cap="flat" cmpd="sng" algn="ctr">
                       <a:solidFill>
                         <a:schemeClr val="accent3"/>
@@ -7017,7 +7025,7 @@
                       <a:endParaRPr lang="en-US" sz="3200" dirty="0"/>
                     </a:p>
                   </a:txBody>
-                  <a:tcPr marR="182880" marT="91440" marB="91440">
+                  <a:tcPr marR="182881" marT="91440" marB="91440">
                     <a:lnL w="12700" cap="flat" cmpd="sng" algn="ctr">
                       <a:solidFill>
                         <a:schemeClr val="accent3"/>
@@ -7066,7 +7074,7 @@
                       <a:endParaRPr lang="en-US" sz="3200" dirty="0"/>
                     </a:p>
                   </a:txBody>
-                  <a:tcPr marR="182880" marT="91440" marB="91440">
+                  <a:tcPr marR="182881" marT="91440" marB="91440">
                     <a:lnL w="12700" cap="flat" cmpd="sng" algn="ctr">
                       <a:solidFill>
                         <a:schemeClr val="accent3"/>
@@ -7123,7 +7131,7 @@
                       </a:r>
                     </a:p>
                   </a:txBody>
-                  <a:tcPr marR="182880" marT="91440" marB="91440" anchor="ctr">
+                  <a:tcPr marR="182881" marT="91440" marB="91440" anchor="ctr">
                     <a:lnL w="12700" cap="flat" cmpd="sng" algn="ctr">
                       <a:solidFill>
                         <a:schemeClr val="accent3"/>
@@ -7163,7 +7171,7 @@
                   </a:ext>
                 </a:extLst>
               </a:tr>
-              <a:tr h="676656">
+              <a:tr h="676657">
                 <a:tc>
                   <a:txBody>
                     <a:bodyPr/>
@@ -7181,7 +7189,7 @@
                       </a:r>
                     </a:p>
                   </a:txBody>
-                  <a:tcPr marR="182880" marT="91440" marB="91440" anchor="ctr">
+                  <a:tcPr marR="182881" marT="91440" marB="91440" anchor="ctr">
                     <a:lnL w="12700" cap="flat" cmpd="sng" algn="ctr">
                       <a:noFill/>
                       <a:prstDash val="solid"/>
@@ -7221,7 +7229,7 @@
                       <a:endParaRPr lang="en-US" sz="3200" dirty="0"/>
                     </a:p>
                   </a:txBody>
-                  <a:tcPr marR="182880" marT="91440" marB="91440">
+                  <a:tcPr marR="182881" marT="91440" marB="91440">
                     <a:lnL w="12700" cap="flat" cmpd="sng" algn="ctr">
                       <a:noFill/>
                       <a:prstDash val="solid"/>
@@ -7265,7 +7273,7 @@
                       <a:endParaRPr lang="en-US" sz="3200" dirty="0"/>
                     </a:p>
                   </a:txBody>
-                  <a:tcPr marR="182880" marT="91440" marB="91440">
+                  <a:tcPr marR="182881" marT="91440" marB="91440">
                     <a:lnL w="12700" cap="flat" cmpd="sng" algn="ctr">
                       <a:solidFill>
                         <a:schemeClr val="accent3"/>
@@ -7311,7 +7319,7 @@
                       <a:endParaRPr lang="en-US" sz="3200" dirty="0"/>
                     </a:p>
                   </a:txBody>
-                  <a:tcPr marR="182880" marT="91440" marB="91440">
+                  <a:tcPr marR="182881" marT="91440" marB="91440">
                     <a:lnL w="12700" cap="flat" cmpd="sng" algn="ctr">
                       <a:solidFill>
                         <a:schemeClr val="accent3"/>
@@ -7357,7 +7365,7 @@
                       <a:endParaRPr lang="en-US" sz="3200" dirty="0"/>
                     </a:p>
                   </a:txBody>
-                  <a:tcPr marR="182880" marT="91440" marB="91440">
+                  <a:tcPr marR="182881" marT="91440" marB="91440">
                     <a:lnL w="12700" cap="flat" cmpd="sng" algn="ctr">
                       <a:solidFill>
                         <a:schemeClr val="accent3"/>
@@ -7403,7 +7411,7 @@
                       <a:endParaRPr lang="en-US" sz="3200" dirty="0"/>
                     </a:p>
                   </a:txBody>
-                  <a:tcPr marR="182880" marT="91440" marB="91440">
+                  <a:tcPr marR="182881" marT="91440" marB="91440">
                     <a:lnL w="12700" cap="flat" cmpd="sng" algn="ctr">
                       <a:solidFill>
                         <a:schemeClr val="accent3"/>
@@ -7449,7 +7457,7 @@
                       <a:endParaRPr lang="en-US" sz="3200" dirty="0"/>
                     </a:p>
                   </a:txBody>
-                  <a:tcPr marR="182880" marT="91440" marB="91440">
+                  <a:tcPr marR="182881" marT="91440" marB="91440">
                     <a:lnL w="12700" cap="flat" cmpd="sng" algn="ctr">
                       <a:solidFill>
                         <a:schemeClr val="accent3"/>
@@ -7495,7 +7503,7 @@
                       <a:endParaRPr lang="en-US" sz="3200" dirty="0"/>
                     </a:p>
                   </a:txBody>
-                  <a:tcPr marR="182880" marT="91440" marB="91440">
+                  <a:tcPr marR="182881" marT="91440" marB="91440">
                     <a:lnL w="12700" cap="flat" cmpd="sng" algn="ctr">
                       <a:solidFill>
                         <a:schemeClr val="accent3"/>
@@ -7541,7 +7549,7 @@
                       <a:endParaRPr lang="en-US" sz="3200" dirty="0"/>
                     </a:p>
                   </a:txBody>
-                  <a:tcPr marR="182880" marT="91440" marB="91440">
+                  <a:tcPr marR="182881" marT="91440" marB="91440">
                     <a:lnL w="12700" cap="flat" cmpd="sng" algn="ctr">
                       <a:solidFill>
                         <a:schemeClr val="accent3"/>
@@ -7590,7 +7598,7 @@
                       <a:endParaRPr lang="en-US" sz="3200" dirty="0"/>
                     </a:p>
                   </a:txBody>
-                  <a:tcPr marR="182880" marT="91440" marB="91440">
+                  <a:tcPr marR="182881" marT="91440" marB="91440">
                     <a:lnL w="12700" cap="flat" cmpd="sng" algn="ctr">
                       <a:solidFill>
                         <a:schemeClr val="accent3"/>
@@ -7648,7 +7656,7 @@
                       </a:r>
                     </a:p>
                   </a:txBody>
-                  <a:tcPr marR="182880" marT="91440" marB="91440" anchor="ctr">
+                  <a:tcPr marR="182881" marT="91440" marB="91440" anchor="ctr">
                     <a:lnL w="12700" cap="flat" cmpd="sng" algn="ctr">
                       <a:solidFill>
                         <a:schemeClr val="accent3"/>
@@ -7750,7 +7758,7 @@
           </a:fontRef>
         </p:style>
         <p:txBody>
-          <a:bodyPr vert="vert270" lIns="91440" tIns="182880" rIns="91440" bIns="91440" rtlCol="0" anchor="ctr"/>
+          <a:bodyPr vert="vert270" lIns="91440" tIns="182881" rIns="91440" bIns="91440" rtlCol="0" anchor="ctr"/>
           <a:lstStyle/>
           <a:p>
             <a:pPr algn="r"/>
@@ -7781,7 +7789,7 @@
         </p:nvSpPr>
         <p:spPr>
           <a:xfrm rot="5400000">
-            <a:off x="5797003" y="565824"/>
+            <a:off x="5797004" y="565824"/>
             <a:ext cx="444024" cy="5990431"/>
           </a:xfrm>
           <a:prstGeom prst="round2SameRect">
@@ -7817,7 +7825,7 @@
           </a:fontRef>
         </p:style>
         <p:txBody>
-          <a:bodyPr vert="vert270" lIns="91440" tIns="182880" rIns="91440" bIns="91440" rtlCol="0" anchor="ctr"/>
+          <a:bodyPr vert="vert270" lIns="91440" tIns="182881" rIns="91440" bIns="91440" rtlCol="0" anchor="ctr"/>
           <a:lstStyle/>
           <a:p>
             <a:pPr algn="r"/>
@@ -7848,8 +7856,8 @@
         </p:nvSpPr>
         <p:spPr>
           <a:xfrm rot="5400000">
-            <a:off x="10715090" y="2742717"/>
-            <a:ext cx="444024" cy="1520190"/>
+            <a:off x="10715093" y="2742721"/>
+            <a:ext cx="444024" cy="1520189"/>
           </a:xfrm>
           <a:prstGeom prst="round2SameRect">
             <a:avLst>
@@ -7895,7 +7903,7 @@
           </a:fontRef>
         </p:style>
         <p:txBody>
-          <a:bodyPr vert="vert270" lIns="91440" tIns="182880" rIns="91440" bIns="91440" rtlCol="0" anchor="ctr"/>
+          <a:bodyPr vert="vert270" lIns="91440" tIns="182881" rIns="91440" bIns="91440" rtlCol="0" anchor="ctr"/>
           <a:lstStyle/>
           <a:p>
             <a:pPr algn="r"/>
@@ -7969,7 +7977,7 @@
           </a:fontRef>
         </p:style>
         <p:txBody>
-          <a:bodyPr vert="vert270" lIns="91440" tIns="182880" rIns="91440" bIns="91440" rtlCol="0" anchor="ctr"/>
+          <a:bodyPr vert="vert270" lIns="91440" tIns="182881" rIns="91440" bIns="91440" rtlCol="0" anchor="ctr"/>
           <a:lstStyle/>
           <a:p>
             <a:pPr algn="r"/>
@@ -8001,7 +8009,7 @@
         <p:spPr>
           <a:xfrm rot="5400000">
             <a:off x="4573993" y="2974922"/>
-            <a:ext cx="444024" cy="3544412"/>
+            <a:ext cx="444024" cy="3544413"/>
           </a:xfrm>
           <a:prstGeom prst="round2SameRect">
             <a:avLst>
@@ -8036,7 +8044,7 @@
           </a:fontRef>
         </p:style>
         <p:txBody>
-          <a:bodyPr vert="vert270" lIns="91440" tIns="182880" rIns="91440" bIns="91440" rtlCol="0" anchor="ctr"/>
+          <a:bodyPr vert="vert270" lIns="91440" tIns="182881" rIns="91440" bIns="91440" rtlCol="0" anchor="ctr"/>
           <a:lstStyle/>
           <a:p>
             <a:pPr algn="r"/>
@@ -8084,8 +8092,8 @@
         </p:blipFill>
         <p:spPr>
           <a:xfrm>
-            <a:off x="11726695" y="2763848"/>
-            <a:ext cx="331470" cy="331470"/>
+            <a:off x="11726696" y="2763849"/>
+            <a:ext cx="331469" cy="331469"/>
           </a:xfrm>
           <a:prstGeom prst="rect">
             <a:avLst/>
@@ -8123,8 +8131,8 @@
         </p:blipFill>
         <p:spPr>
           <a:xfrm>
-            <a:off x="11711712" y="3960903"/>
-            <a:ext cx="331470" cy="331470"/>
+            <a:off x="11711713" y="3960904"/>
+            <a:ext cx="331469" cy="331469"/>
           </a:xfrm>
           <a:prstGeom prst="rect">
             <a:avLst/>
@@ -8145,8 +8153,8 @@
         </p:nvSpPr>
         <p:spPr>
           <a:xfrm>
-            <a:off x="0" y="6090509"/>
-            <a:ext cx="16459200" cy="10798613"/>
+            <a:off x="-1" y="6090510"/>
+            <a:ext cx="16459201" cy="10798613"/>
           </a:xfrm>
           <a:prstGeom prst="rect">
             <a:avLst/>
@@ -8193,7 +8201,7 @@
           <a:lstStyle/>
           <a:p>
             <a:pPr algn="ctr"/>
-            <a:endParaRPr lang="en-US"/>
+            <a:endParaRPr lang="en-US" sz="1125"/>
           </a:p>
         </p:txBody>
       </p:sp>
@@ -8211,7 +8219,7 @@
         </p:nvSpPr>
         <p:spPr>
           <a:xfrm>
-            <a:off x="1341689" y="6379725"/>
+            <a:off x="1341690" y="6379727"/>
             <a:ext cx="4949241" cy="757130"/>
           </a:xfrm>
           <a:prstGeom prst="rect">
@@ -8252,7 +8260,7 @@
         </p:nvSpPr>
         <p:spPr>
           <a:xfrm>
-            <a:off x="1341691" y="6379725"/>
+            <a:off x="1341692" y="6379724"/>
             <a:ext cx="1441990" cy="3169778"/>
           </a:xfrm>
           <a:prstGeom prst="rect">
@@ -8334,7 +8342,7 @@
         </p:nvSpPr>
         <p:spPr>
           <a:xfrm>
-            <a:off x="1341691" y="8284863"/>
+            <a:off x="1341692" y="8284863"/>
             <a:ext cx="1441990" cy="3169778"/>
           </a:xfrm>
           <a:prstGeom prst="rect">
@@ -8375,7 +8383,7 @@
         </p:nvSpPr>
         <p:spPr>
           <a:xfrm>
-            <a:off x="2545743" y="9663070"/>
+            <a:off x="2545743" y="9663068"/>
             <a:ext cx="1911965" cy="1015663"/>
           </a:xfrm>
           <a:prstGeom prst="rect">
@@ -8416,8 +8424,8 @@
         </p:nvSpPr>
         <p:spPr>
           <a:xfrm>
-            <a:off x="4821704" y="6398775"/>
-            <a:ext cx="1390093" cy="3169778"/>
+            <a:off x="4821705" y="6398775"/>
+            <a:ext cx="1390094" cy="3169778"/>
           </a:xfrm>
           <a:prstGeom prst="rect">
             <a:avLst/>
@@ -8459,7 +8467,7 @@
         </p:nvSpPr>
         <p:spPr>
           <a:xfrm>
-            <a:off x="5151350" y="9523027"/>
+            <a:off x="5151353" y="9523027"/>
             <a:ext cx="2541527" cy="1015663"/>
           </a:xfrm>
           <a:prstGeom prst="rect">
@@ -8500,8 +8508,8 @@
         </p:nvSpPr>
         <p:spPr>
           <a:xfrm>
-            <a:off x="5488454" y="6379725"/>
-            <a:ext cx="1390093" cy="3169778"/>
+            <a:off x="5488455" y="6379724"/>
+            <a:ext cx="1390094" cy="3169778"/>
           </a:xfrm>
           <a:prstGeom prst="rect">
             <a:avLst/>
@@ -8543,8 +8551,8 @@
         </p:nvSpPr>
         <p:spPr>
           <a:xfrm>
-            <a:off x="6326654" y="6379725"/>
-            <a:ext cx="1390093" cy="3169778"/>
+            <a:off x="6326655" y="6379724"/>
+            <a:ext cx="1390094" cy="3169778"/>
           </a:xfrm>
           <a:prstGeom prst="rect">
             <a:avLst/>
@@ -8586,8 +8594,8 @@
         </p:nvSpPr>
         <p:spPr>
           <a:xfrm>
-            <a:off x="5717859" y="8663344"/>
-            <a:ext cx="1827439" cy="861774"/>
+            <a:off x="5717861" y="8663344"/>
+            <a:ext cx="1827440" cy="861774"/>
           </a:xfrm>
           <a:prstGeom prst="rect">
             <a:avLst/>
@@ -8630,8 +8638,8 @@
         </p:nvSpPr>
         <p:spPr>
           <a:xfrm>
-            <a:off x="12221926" y="6306418"/>
-            <a:ext cx="1390093" cy="3169778"/>
+            <a:off x="12221927" y="6306418"/>
+            <a:ext cx="1390094" cy="3169778"/>
           </a:xfrm>
           <a:prstGeom prst="rect">
             <a:avLst/>
@@ -8671,8 +8679,8 @@
         </p:nvSpPr>
         <p:spPr>
           <a:xfrm>
-            <a:off x="13060126" y="6306418"/>
-            <a:ext cx="1390093" cy="3169778"/>
+            <a:off x="13060127" y="6306418"/>
+            <a:ext cx="1390094" cy="3169778"/>
           </a:xfrm>
           <a:prstGeom prst="rect">
             <a:avLst/>
@@ -8712,8 +8720,8 @@
         </p:nvSpPr>
         <p:spPr>
           <a:xfrm>
-            <a:off x="12479598" y="8611916"/>
-            <a:ext cx="1827439" cy="861774"/>
+            <a:off x="12479601" y="8611916"/>
+            <a:ext cx="1827440" cy="861774"/>
           </a:xfrm>
           <a:prstGeom prst="rect">
             <a:avLst/>
@@ -8758,7 +8766,7 @@
         </p:nvSpPr>
         <p:spPr>
           <a:xfrm>
-            <a:off x="12124646" y="9471596"/>
+            <a:off x="12124649" y="9471596"/>
             <a:ext cx="2541527" cy="1015663"/>
           </a:xfrm>
           <a:prstGeom prst="rect">
@@ -8811,7 +8819,7 @@
           </p:nvPr>
         </p:nvGraphicFramePr>
         <p:xfrm>
-          <a:off x="1341688" y="11408342"/>
+          <a:off x="1341688" y="11408343"/>
           <a:ext cx="13775824" cy="4660470"/>
         </p:xfrm>
         <a:graphic>
@@ -8834,8 +8842,8 @@
         </p:nvSpPr>
         <p:spPr>
           <a:xfrm>
-            <a:off x="12951054" y="1336377"/>
-            <a:ext cx="1715120" cy="369332"/>
+            <a:off x="12951057" y="1336378"/>
+            <a:ext cx="1715120" cy="369331"/>
           </a:xfrm>
           <a:prstGeom prst="roundRect">
             <a:avLst>
@@ -8909,8 +8917,8 @@
         </p:nvSpPr>
         <p:spPr>
           <a:xfrm>
-            <a:off x="8328955" y="6372758"/>
-            <a:ext cx="1390093" cy="3169778"/>
+            <a:off x="8328957" y="6372758"/>
+            <a:ext cx="1390094" cy="3169778"/>
           </a:xfrm>
           <a:prstGeom prst="rect">
             <a:avLst/>
@@ -8952,7 +8960,7 @@
         </p:nvSpPr>
         <p:spPr>
           <a:xfrm>
-            <a:off x="8658601" y="9497010"/>
+            <a:off x="8658604" y="9497010"/>
             <a:ext cx="2541527" cy="1015663"/>
           </a:xfrm>
           <a:prstGeom prst="rect">
@@ -8993,8 +9001,8 @@
         </p:nvSpPr>
         <p:spPr>
           <a:xfrm>
-            <a:off x="8995705" y="6353708"/>
-            <a:ext cx="1390093" cy="3169778"/>
+            <a:off x="8995706" y="6353709"/>
+            <a:ext cx="1390094" cy="3169778"/>
           </a:xfrm>
           <a:prstGeom prst="rect">
             <a:avLst/>
@@ -9036,8 +9044,8 @@
         </p:nvSpPr>
         <p:spPr>
           <a:xfrm>
-            <a:off x="9833905" y="6353708"/>
-            <a:ext cx="1390093" cy="3169778"/>
+            <a:off x="9833907" y="6353709"/>
+            <a:ext cx="1390094" cy="3169778"/>
           </a:xfrm>
           <a:prstGeom prst="rect">
             <a:avLst/>
@@ -9079,8 +9087,8 @@
         </p:nvSpPr>
         <p:spPr>
           <a:xfrm>
-            <a:off x="9225108" y="8637328"/>
-            <a:ext cx="1827439" cy="861774"/>
+            <a:off x="9225110" y="8637328"/>
+            <a:ext cx="1827440" cy="861774"/>
           </a:xfrm>
           <a:prstGeom prst="rect">
             <a:avLst/>
@@ -9123,7 +9131,7 @@
         </p:nvSpPr>
         <p:spPr>
           <a:xfrm>
-            <a:off x="1341689" y="17368304"/>
+            <a:off x="1341690" y="17368304"/>
             <a:ext cx="4949241" cy="757130"/>
           </a:xfrm>
           <a:prstGeom prst="rect">
@@ -9164,8 +9172,8 @@
         </p:nvSpPr>
         <p:spPr>
           <a:xfrm>
-            <a:off x="1341694" y="18215551"/>
-            <a:ext cx="7654015" cy="1938992"/>
+            <a:off x="1341695" y="18215555"/>
+            <a:ext cx="7654016" cy="1938992"/>
           </a:xfrm>
           <a:prstGeom prst="rect">
             <a:avLst/>
@@ -9286,8 +9294,8 @@
         </p:nvSpPr>
         <p:spPr>
           <a:xfrm>
-            <a:off x="11131862" y="18053397"/>
-            <a:ext cx="3764018" cy="546152"/>
+            <a:off x="11131864" y="18053397"/>
+            <a:ext cx="3764017" cy="546152"/>
           </a:xfrm>
           <a:prstGeom prst="roundRect">
             <a:avLst>
@@ -9350,8 +9358,8 @@
         </p:nvSpPr>
         <p:spPr>
           <a:xfrm>
-            <a:off x="11131862" y="18788632"/>
-            <a:ext cx="3764018" cy="546152"/>
+            <a:off x="11131864" y="18788632"/>
+            <a:ext cx="3764017" cy="546152"/>
           </a:xfrm>
           <a:prstGeom prst="roundRect">
             <a:avLst>
@@ -9414,8 +9422,8 @@
         </p:nvSpPr>
         <p:spPr>
           <a:xfrm>
-            <a:off x="11131861" y="19523865"/>
-            <a:ext cx="3764018" cy="546152"/>
+            <a:off x="11131864" y="19523865"/>
+            <a:ext cx="3764017" cy="546152"/>
           </a:xfrm>
           <a:prstGeom prst="roundRect">
             <a:avLst>
@@ -9496,8 +9504,8 @@
         </p:nvSpPr>
         <p:spPr>
           <a:xfrm>
-            <a:off x="0" y="20951878"/>
-            <a:ext cx="16459200" cy="2879672"/>
+            <a:off x="-1" y="20951878"/>
+            <a:ext cx="16459201" cy="2879672"/>
           </a:xfrm>
           <a:prstGeom prst="rect">
             <a:avLst/>
@@ -9532,7 +9540,7 @@
           <a:lstStyle/>
           <a:p>
             <a:pPr algn="ctr"/>
-            <a:endParaRPr lang="en-US" dirty="0"/>
+            <a:endParaRPr lang="en-US" sz="1125" dirty="0"/>
           </a:p>
         </p:txBody>
       </p:sp>
@@ -9550,7 +9558,7 @@
         </p:nvSpPr>
         <p:spPr>
           <a:xfrm>
-            <a:off x="505872" y="22310169"/>
+            <a:off x="505871" y="22310171"/>
             <a:ext cx="2042248" cy="400110"/>
           </a:xfrm>
           <a:prstGeom prst="rect">
@@ -9603,8 +9611,8 @@
         </p:nvSpPr>
         <p:spPr>
           <a:xfrm>
-            <a:off x="500548" y="22641859"/>
-            <a:ext cx="7654015" cy="400110"/>
+            <a:off x="500549" y="22641859"/>
+            <a:ext cx="7654016" cy="400110"/>
           </a:xfrm>
           <a:prstGeom prst="rect">
             <a:avLst/>

</xml_diff>